<commit_message>
Using json output for final example
</commit_message>
<xml_diff>
--- a/Slides.pptx
+++ b/Slides.pptx
@@ -207,7 +207,7 @@
           <a:p>
             <a:fld id="{65038154-CDDF-1045-AB0B-5A4C4D28411B}" type="datetimeFigureOut">
               <a:rPr lang="en-US" smtClean="0"/>
-              <a:t>12/7/21</a:t>
+              <a:t>12/9/21</a:t>
             </a:fld>
             <a:endParaRPr lang="en-US"/>
           </a:p>
@@ -1171,7 +1171,7 @@
           <a:p>
             <a:fld id="{53BEF823-48A5-43FC-BE03-E79964288B41}" type="datetimeFigureOut">
               <a:rPr lang="en-US" smtClean="0"/>
-              <a:t>12/7/21</a:t>
+              <a:t>12/9/21</a:t>
             </a:fld>
             <a:endParaRPr lang="en-US" dirty="0"/>
           </a:p>
@@ -1382,7 +1382,7 @@
             <a:fld id="{53BEF823-48A5-43FC-BE03-E79964288B41}" type="datetimeFigureOut">
               <a:rPr lang="en-US" smtClean="0"/>
               <a:pPr algn="r"/>
-              <a:t>12/7/21</a:t>
+              <a:t>12/9/21</a:t>
             </a:fld>
             <a:endParaRPr lang="en-US" dirty="0"/>
           </a:p>
@@ -1597,7 +1597,7 @@
             <a:fld id="{53BEF823-48A5-43FC-BE03-E79964288B41}" type="datetimeFigureOut">
               <a:rPr lang="en-US" smtClean="0"/>
               <a:pPr algn="r"/>
-              <a:t>12/7/21</a:t>
+              <a:t>12/9/21</a:t>
             </a:fld>
             <a:endParaRPr lang="en-US" dirty="0"/>
           </a:p>
@@ -1800,7 +1800,7 @@
             <a:fld id="{53BEF823-48A5-43FC-BE03-E79964288B41}" type="datetimeFigureOut">
               <a:rPr lang="en-US" smtClean="0"/>
               <a:pPr algn="r"/>
-              <a:t>12/7/21</a:t>
+              <a:t>12/9/21</a:t>
             </a:fld>
             <a:endParaRPr lang="en-US" dirty="0"/>
           </a:p>
@@ -2084,7 +2084,7 @@
             <a:fld id="{53BEF823-48A5-43FC-BE03-E79964288B41}" type="datetimeFigureOut">
               <a:rPr lang="en-US" smtClean="0"/>
               <a:pPr algn="r"/>
-              <a:t>12/7/21</a:t>
+              <a:t>12/9/21</a:t>
             </a:fld>
             <a:endParaRPr lang="en-US" dirty="0"/>
           </a:p>
@@ -2328,7 +2328,7 @@
             <a:fld id="{53BEF823-48A5-43FC-BE03-E79964288B41}" type="datetimeFigureOut">
               <a:rPr lang="en-US" smtClean="0"/>
               <a:pPr algn="r"/>
-              <a:t>12/7/21</a:t>
+              <a:t>12/9/21</a:t>
             </a:fld>
             <a:endParaRPr lang="en-US" dirty="0"/>
           </a:p>
@@ -2771,7 +2771,7 @@
             <a:fld id="{53BEF823-48A5-43FC-BE03-E79964288B41}" type="datetimeFigureOut">
               <a:rPr lang="en-US" smtClean="0"/>
               <a:pPr algn="r"/>
-              <a:t>12/7/21</a:t>
+              <a:t>12/9/21</a:t>
             </a:fld>
             <a:endParaRPr lang="en-US" dirty="0"/>
           </a:p>
@@ -2917,7 +2917,7 @@
             <a:fld id="{53BEF823-48A5-43FC-BE03-E79964288B41}" type="datetimeFigureOut">
               <a:rPr lang="en-US" smtClean="0"/>
               <a:pPr algn="r"/>
-              <a:t>12/7/21</a:t>
+              <a:t>12/9/21</a:t>
             </a:fld>
             <a:endParaRPr lang="en-US" dirty="0"/>
           </a:p>
@@ -3035,7 +3035,7 @@
             <a:fld id="{53BEF823-48A5-43FC-BE03-E79964288B41}" type="datetimeFigureOut">
               <a:rPr lang="en-US" smtClean="0"/>
               <a:pPr algn="r"/>
-              <a:t>12/7/21</a:t>
+              <a:t>12/9/21</a:t>
             </a:fld>
             <a:endParaRPr lang="en-US" dirty="0"/>
           </a:p>
@@ -3319,7 +3319,7 @@
             <a:fld id="{53BEF823-48A5-43FC-BE03-E79964288B41}" type="datetimeFigureOut">
               <a:rPr lang="en-US" smtClean="0"/>
               <a:pPr algn="r"/>
-              <a:t>12/7/21</a:t>
+              <a:t>12/9/21</a:t>
             </a:fld>
             <a:endParaRPr lang="en-US" dirty="0"/>
           </a:p>
@@ -3614,7 +3614,7 @@
             <a:fld id="{53BEF823-48A5-43FC-BE03-E79964288B41}" type="datetimeFigureOut">
               <a:rPr lang="en-US" smtClean="0"/>
               <a:pPr algn="r"/>
-              <a:t>12/7/21</a:t>
+              <a:t>12/9/21</a:t>
             </a:fld>
             <a:endParaRPr lang="en-US" dirty="0"/>
           </a:p>
@@ -4109,7 +4109,7 @@
             <a:fld id="{53BEF823-48A5-43FC-BE03-E79964288B41}" type="datetimeFigureOut">
               <a:rPr lang="en-US" smtClean="0"/>
               <a:pPr algn="r"/>
-              <a:t>12/7/21</a:t>
+              <a:t>12/9/21</a:t>
             </a:fld>
             <a:endParaRPr lang="en-US" dirty="0"/>
           </a:p>
@@ -4732,7 +4732,7 @@
           <a:p>
             <a:r>
               <a:rPr lang="en-US"/>
-              <a:t>It’s not as low level as one might thing</a:t>
+              <a:t>It’s not as low level as one might think</a:t>
             </a:r>
           </a:p>
         </p:txBody>

</xml_diff>

<commit_message>
Updated slides with newer code
</commit_message>
<xml_diff>
--- a/Slides.pptx
+++ b/Slides.pptx
@@ -4731,7 +4731,7 @@
           <a:lstStyle/>
           <a:p>
             <a:r>
-              <a:rPr lang="en-US"/>
+              <a:rPr lang="en-US" dirty="0"/>
               <a:t>It’s not as low level as one might think</a:t>
             </a:r>
           </a:p>
@@ -8901,10 +8901,10 @@
       </p:sp>
       <p:pic>
         <p:nvPicPr>
-          <p:cNvPr id="5" name="Picture 4">
-            <a:extLst>
-              <a:ext uri="{FF2B5EF4-FFF2-40B4-BE49-F238E27FC236}">
-                <a16:creationId xmlns:a16="http://schemas.microsoft.com/office/drawing/2014/main" id="{421C44E5-8FB1-B14A-B300-9A14043E1D45}"/>
+          <p:cNvPr id="4" name="Picture 3">
+            <a:extLst>
+              <a:ext uri="{FF2B5EF4-FFF2-40B4-BE49-F238E27FC236}">
+                <a16:creationId xmlns:a16="http://schemas.microsoft.com/office/drawing/2014/main" id="{0EB23727-6C64-994A-9317-AD04AF75B540}"/>
               </a:ext>
             </a:extLst>
           </p:cNvPr>
@@ -8921,8 +8921,8 @@
         </p:blipFill>
         <p:spPr>
           <a:xfrm>
-            <a:off x="1038779" y="2825835"/>
-            <a:ext cx="9309100" cy="3162300"/>
+            <a:off x="1055981" y="2979346"/>
+            <a:ext cx="10542558" cy="2855276"/>
           </a:xfrm>
           <a:prstGeom prst="rect">
             <a:avLst/>
@@ -8943,8 +8943,8 @@
         </p:nvSpPr>
         <p:spPr>
           <a:xfrm>
-            <a:off x="1669409" y="4389540"/>
-            <a:ext cx="2667699" cy="318781"/>
+            <a:off x="7776754" y="4406984"/>
+            <a:ext cx="2412276" cy="365313"/>
           </a:xfrm>
           <a:prstGeom prst="frame">
             <a:avLst/>
@@ -9443,10 +9443,10 @@
       </p:sp>
       <p:pic>
         <p:nvPicPr>
-          <p:cNvPr id="5" name="Picture 4">
-            <a:extLst>
-              <a:ext uri="{FF2B5EF4-FFF2-40B4-BE49-F238E27FC236}">
-                <a16:creationId xmlns:a16="http://schemas.microsoft.com/office/drawing/2014/main" id="{A75C858E-2DA5-3D4E-BB5B-8EBBEFFD5664}"/>
+          <p:cNvPr id="4" name="Picture 3">
+            <a:extLst>
+              <a:ext uri="{FF2B5EF4-FFF2-40B4-BE49-F238E27FC236}">
+                <a16:creationId xmlns:a16="http://schemas.microsoft.com/office/drawing/2014/main" id="{40231533-D9E9-9A49-9F69-E76249EC3731}"/>
               </a:ext>
             </a:extLst>
           </p:cNvPr>
@@ -9463,8 +9463,8 @@
         </p:blipFill>
         <p:spPr>
           <a:xfrm>
-            <a:off x="1048624" y="2851254"/>
-            <a:ext cx="10378325" cy="3336229"/>
+            <a:off x="1055733" y="2877424"/>
+            <a:ext cx="7879261" cy="3658607"/>
           </a:xfrm>
           <a:prstGeom prst="rect">
             <a:avLst/>
@@ -9485,8 +9485,8 @@
         </p:nvSpPr>
         <p:spPr>
           <a:xfrm>
-            <a:off x="1442905" y="4244829"/>
-            <a:ext cx="9984044" cy="562063"/>
+            <a:off x="2003961" y="4339969"/>
+            <a:ext cx="6565273" cy="920008"/>
           </a:xfrm>
           <a:prstGeom prst="frame">
             <a:avLst/>
@@ -9985,10 +9985,10 @@
       </p:sp>
       <p:pic>
         <p:nvPicPr>
-          <p:cNvPr id="4" name="Picture 3">
-            <a:extLst>
-              <a:ext uri="{FF2B5EF4-FFF2-40B4-BE49-F238E27FC236}">
-                <a16:creationId xmlns:a16="http://schemas.microsoft.com/office/drawing/2014/main" id="{3D41C965-8D48-1040-BACC-FD5A9931E397}"/>
+          <p:cNvPr id="5" name="Picture 4">
+            <a:extLst>
+              <a:ext uri="{FF2B5EF4-FFF2-40B4-BE49-F238E27FC236}">
+                <a16:creationId xmlns:a16="http://schemas.microsoft.com/office/drawing/2014/main" id="{0454D58D-6A3F-AD41-8685-E9073197816A}"/>
               </a:ext>
             </a:extLst>
           </p:cNvPr>
@@ -10005,8 +10005,8 @@
         </p:blipFill>
         <p:spPr>
           <a:xfrm>
-            <a:off x="1012950" y="2877156"/>
-            <a:ext cx="10414000" cy="3467100"/>
+            <a:off x="981456" y="2876549"/>
+            <a:ext cx="10733918" cy="3262993"/>
           </a:xfrm>
           <a:prstGeom prst="rect">
             <a:avLst/>
@@ -10027,8 +10027,8 @@
         </p:nvSpPr>
         <p:spPr>
           <a:xfrm>
-            <a:off x="5008228" y="4127357"/>
-            <a:ext cx="6418722" cy="335586"/>
+            <a:off x="5138857" y="4685211"/>
+            <a:ext cx="5572686" cy="369914"/>
           </a:xfrm>
           <a:prstGeom prst="frame">
             <a:avLst/>

</xml_diff>